<commit_message>
Update draw (IEICE extended).pptx
</commit_message>
<xml_diff>
--- a/images/draw (IEICE extended).pptx
+++ b/images/draw (IEICE extended).pptx
@@ -261,7 +261,7 @@
           <a:p>
             <a:fld id="{F3B8E073-128F-49A8-A50F-B9D43F2C8A21}" type="datetimeFigureOut">
               <a:rPr lang="en-CA" smtClean="0"/>
-              <a:t>2024-12-03</a:t>
+              <a:t>2025-01-03</a:t>
             </a:fld>
             <a:endParaRPr lang="en-CA"/>
           </a:p>
@@ -461,7 +461,7 @@
           <a:p>
             <a:fld id="{F3B8E073-128F-49A8-A50F-B9D43F2C8A21}" type="datetimeFigureOut">
               <a:rPr lang="en-CA" smtClean="0"/>
-              <a:t>2024-12-03</a:t>
+              <a:t>2025-01-03</a:t>
             </a:fld>
             <a:endParaRPr lang="en-CA"/>
           </a:p>
@@ -671,7 +671,7 @@
           <a:p>
             <a:fld id="{F3B8E073-128F-49A8-A50F-B9D43F2C8A21}" type="datetimeFigureOut">
               <a:rPr lang="en-CA" smtClean="0"/>
-              <a:t>2024-12-03</a:t>
+              <a:t>2025-01-03</a:t>
             </a:fld>
             <a:endParaRPr lang="en-CA"/>
           </a:p>
@@ -871,7 +871,7 @@
           <a:p>
             <a:fld id="{F3B8E073-128F-49A8-A50F-B9D43F2C8A21}" type="datetimeFigureOut">
               <a:rPr lang="en-CA" smtClean="0"/>
-              <a:t>2024-12-03</a:t>
+              <a:t>2025-01-03</a:t>
             </a:fld>
             <a:endParaRPr lang="en-CA"/>
           </a:p>
@@ -1147,7 +1147,7 @@
           <a:p>
             <a:fld id="{F3B8E073-128F-49A8-A50F-B9D43F2C8A21}" type="datetimeFigureOut">
               <a:rPr lang="en-CA" smtClean="0"/>
-              <a:t>2024-12-03</a:t>
+              <a:t>2025-01-03</a:t>
             </a:fld>
             <a:endParaRPr lang="en-CA"/>
           </a:p>
@@ -1415,7 +1415,7 @@
           <a:p>
             <a:fld id="{F3B8E073-128F-49A8-A50F-B9D43F2C8A21}" type="datetimeFigureOut">
               <a:rPr lang="en-CA" smtClean="0"/>
-              <a:t>2024-12-03</a:t>
+              <a:t>2025-01-03</a:t>
             </a:fld>
             <a:endParaRPr lang="en-CA"/>
           </a:p>
@@ -1830,7 +1830,7 @@
           <a:p>
             <a:fld id="{F3B8E073-128F-49A8-A50F-B9D43F2C8A21}" type="datetimeFigureOut">
               <a:rPr lang="en-CA" smtClean="0"/>
-              <a:t>2024-12-03</a:t>
+              <a:t>2025-01-03</a:t>
             </a:fld>
             <a:endParaRPr lang="en-CA"/>
           </a:p>
@@ -1972,7 +1972,7 @@
           <a:p>
             <a:fld id="{F3B8E073-128F-49A8-A50F-B9D43F2C8A21}" type="datetimeFigureOut">
               <a:rPr lang="en-CA" smtClean="0"/>
-              <a:t>2024-12-03</a:t>
+              <a:t>2025-01-03</a:t>
             </a:fld>
             <a:endParaRPr lang="en-CA"/>
           </a:p>
@@ -2085,7 +2085,7 @@
           <a:p>
             <a:fld id="{F3B8E073-128F-49A8-A50F-B9D43F2C8A21}" type="datetimeFigureOut">
               <a:rPr lang="en-CA" smtClean="0"/>
-              <a:t>2024-12-03</a:t>
+              <a:t>2025-01-03</a:t>
             </a:fld>
             <a:endParaRPr lang="en-CA"/>
           </a:p>
@@ -2398,7 +2398,7 @@
           <a:p>
             <a:fld id="{F3B8E073-128F-49A8-A50F-B9D43F2C8A21}" type="datetimeFigureOut">
               <a:rPr lang="en-CA" smtClean="0"/>
-              <a:t>2024-12-03</a:t>
+              <a:t>2025-01-03</a:t>
             </a:fld>
             <a:endParaRPr lang="en-CA"/>
           </a:p>
@@ -2687,7 +2687,7 @@
           <a:p>
             <a:fld id="{F3B8E073-128F-49A8-A50F-B9D43F2C8A21}" type="datetimeFigureOut">
               <a:rPr lang="en-CA" smtClean="0"/>
-              <a:t>2024-12-03</a:t>
+              <a:t>2025-01-03</a:t>
             </a:fld>
             <a:endParaRPr lang="en-CA"/>
           </a:p>
@@ -2930,7 +2930,7 @@
           <a:p>
             <a:fld id="{F3B8E073-128F-49A8-A50F-B9D43F2C8A21}" type="datetimeFigureOut">
               <a:rPr lang="en-CA" smtClean="0"/>
-              <a:t>2024-12-03</a:t>
+              <a:t>2025-01-03</a:t>
             </a:fld>
             <a:endParaRPr lang="en-CA"/>
           </a:p>
@@ -3462,8 +3462,8 @@
           </a:fontRef>
         </p:style>
       </p:cxnSp>
-      <mc:AlternateContent xmlns:mc="http://schemas.openxmlformats.org/markup-compatibility/2006">
-        <mc:Choice xmlns:a14="http://schemas.microsoft.com/office/drawing/2010/main" Requires="a14">
+      <mc:AlternateContent xmlns:mc="http://schemas.openxmlformats.org/markup-compatibility/2006" xmlns:a14="http://schemas.microsoft.com/office/drawing/2010/main">
+        <mc:Choice Requires="a14">
           <p:sp>
             <p:nvSpPr>
               <p:cNvPr id="4" name="Rectangle 3">
@@ -3550,40 +3550,15 @@
                           </m:ctrlPr>
                         </m:dPr>
                         <m:e>
-                          <m:sSub>
-                            <m:sSubPr>
-                              <m:ctrlPr>
-                                <a:rPr lang="vi-VN" sz="1400" i="1" dirty="0" smtClean="0">
-                                  <a:solidFill>
-                                    <a:schemeClr val="tx1"/>
-                                  </a:solidFill>
-                                  <a:latin typeface="Cambria Math" panose="02040503050406030204" pitchFamily="18" charset="0"/>
-                                </a:rPr>
-                              </m:ctrlPr>
-                            </m:sSubPr>
-                            <m:e>
-                              <m:r>
-                                <a:rPr lang="en-US" sz="1400" b="0" i="1" dirty="0" smtClean="0">
-                                  <a:solidFill>
-                                    <a:schemeClr val="tx1"/>
-                                  </a:solidFill>
-                                  <a:latin typeface="Cambria Math" panose="02040503050406030204" pitchFamily="18" charset="0"/>
-                                </a:rPr>
-                                <m:t>𝜃</m:t>
-                              </m:r>
-                            </m:e>
-                            <m:sub>
-                              <m:r>
-                                <a:rPr lang="vi-VN" sz="1400" b="0" i="1" dirty="0">
-                                  <a:solidFill>
-                                    <a:schemeClr val="tx1"/>
-                                  </a:solidFill>
-                                  <a:latin typeface="Cambria Math" panose="02040503050406030204" pitchFamily="18" charset="0"/>
-                                </a:rPr>
-                                <m:t>𝑗</m:t>
-                              </m:r>
-                            </m:sub>
-                          </m:sSub>
+                          <m:r>
+                            <a:rPr lang="vi-VN" sz="1400" b="1" i="1" dirty="0" smtClean="0">
+                              <a:solidFill>
+                                <a:schemeClr val="tx1"/>
+                              </a:solidFill>
+                              <a:latin typeface="Cambria Math" panose="02040503050406030204" pitchFamily="18" charset="0"/>
+                            </a:rPr>
+                            <m:t>𝜽</m:t>
+                          </m:r>
                         </m:e>
                       </m:d>
                       <m:r>
@@ -3607,7 +3582,7 @@
             </p:txBody>
           </p:sp>
         </mc:Choice>
-        <mc:Fallback>
+        <mc:Fallback xmlns="">
           <p:sp>
             <p:nvSpPr>
               <p:cNvPr id="4" name="Rectangle 3">
@@ -3633,7 +3608,7 @@
               <a:blipFill>
                 <a:blip r:embed="rId2"/>
                 <a:stretch>
-                  <a:fillRect l="-8333"/>
+                  <a:fillRect l="-5000"/>
                 </a:stretch>
               </a:blipFill>
               <a:ln>
@@ -3657,8 +3632,8 @@
           </p:sp>
         </mc:Fallback>
       </mc:AlternateContent>
-      <mc:AlternateContent xmlns:mc="http://schemas.openxmlformats.org/markup-compatibility/2006">
-        <mc:Choice xmlns:a14="http://schemas.microsoft.com/office/drawing/2010/main" Requires="a14">
+      <mc:AlternateContent xmlns:mc="http://schemas.openxmlformats.org/markup-compatibility/2006" xmlns:a14="http://schemas.microsoft.com/office/drawing/2010/main">
+        <mc:Choice Requires="a14">
           <p:sp>
             <p:nvSpPr>
               <p:cNvPr id="5" name="TextBox 4">
@@ -3739,7 +3714,7 @@
             </p:txBody>
           </p:sp>
         </mc:Choice>
-        <mc:Fallback>
+        <mc:Fallback xmlns="">
           <p:sp>
             <p:nvSpPr>
               <p:cNvPr id="5" name="TextBox 4">
@@ -4451,8 +4426,8 @@
           </a:p>
         </p:txBody>
       </p:sp>
-      <mc:AlternateContent xmlns:mc="http://schemas.openxmlformats.org/markup-compatibility/2006">
-        <mc:Choice xmlns:a14="http://schemas.microsoft.com/office/drawing/2010/main" Requires="a14">
+      <mc:AlternateContent xmlns:mc="http://schemas.openxmlformats.org/markup-compatibility/2006" xmlns:a14="http://schemas.microsoft.com/office/drawing/2010/main">
+        <mc:Choice Requires="a14">
           <p:sp>
             <p:nvSpPr>
               <p:cNvPr id="42" name="TextBox 41">
@@ -4699,7 +4674,7 @@
             </p:txBody>
           </p:sp>
         </mc:Choice>
-        <mc:Fallback>
+        <mc:Fallback xmlns="">
           <p:sp>
             <p:nvSpPr>
               <p:cNvPr id="42" name="TextBox 41">
@@ -4744,8 +4719,8 @@
           </p:sp>
         </mc:Fallback>
       </mc:AlternateContent>
-      <mc:AlternateContent xmlns:mc="http://schemas.openxmlformats.org/markup-compatibility/2006">
-        <mc:Choice xmlns:a14="http://schemas.microsoft.com/office/drawing/2010/main" Requires="a14">
+      <mc:AlternateContent xmlns:mc="http://schemas.openxmlformats.org/markup-compatibility/2006" xmlns:a14="http://schemas.microsoft.com/office/drawing/2010/main">
+        <mc:Choice Requires="a14">
           <p:sp>
             <p:nvSpPr>
               <p:cNvPr id="46" name="TextBox 45">
@@ -5074,7 +5049,7 @@
             </p:txBody>
           </p:sp>
         </mc:Choice>
-        <mc:Fallback>
+        <mc:Fallback xmlns="">
           <p:sp>
             <p:nvSpPr>
               <p:cNvPr id="46" name="TextBox 45">
@@ -5165,8 +5140,8 @@
           </a:fontRef>
         </p:style>
       </p:cxnSp>
-      <mc:AlternateContent xmlns:mc="http://schemas.openxmlformats.org/markup-compatibility/2006">
-        <mc:Choice xmlns:a14="http://schemas.microsoft.com/office/drawing/2010/main" Requires="a14">
+      <mc:AlternateContent xmlns:mc="http://schemas.openxmlformats.org/markup-compatibility/2006" xmlns:a14="http://schemas.microsoft.com/office/drawing/2010/main">
+        <mc:Choice Requires="a14">
           <p:sp>
             <p:nvSpPr>
               <p:cNvPr id="57" name="TextBox 56">
@@ -5340,7 +5315,7 @@
             </p:txBody>
           </p:sp>
         </mc:Choice>
-        <mc:Fallback>
+        <mc:Fallback xmlns="">
           <p:sp>
             <p:nvSpPr>
               <p:cNvPr id="57" name="TextBox 56">
@@ -5385,8 +5360,8 @@
           </p:sp>
         </mc:Fallback>
       </mc:AlternateContent>
-      <mc:AlternateContent xmlns:mc="http://schemas.openxmlformats.org/markup-compatibility/2006">
-        <mc:Choice xmlns:a14="http://schemas.microsoft.com/office/drawing/2010/main" Requires="a14">
+      <mc:AlternateContent xmlns:mc="http://schemas.openxmlformats.org/markup-compatibility/2006" xmlns:a14="http://schemas.microsoft.com/office/drawing/2010/main">
+        <mc:Choice Requires="a14">
           <p:sp>
             <p:nvSpPr>
               <p:cNvPr id="58" name="TextBox 57">
@@ -5488,7 +5463,7 @@
             </p:txBody>
           </p:sp>
         </mc:Choice>
-        <mc:Fallback>
+        <mc:Fallback xmlns="">
           <p:sp>
             <p:nvSpPr>
               <p:cNvPr id="58" name="TextBox 57">
@@ -5672,8 +5647,8 @@
           </a:p>
         </p:txBody>
       </p:sp>
-      <mc:AlternateContent xmlns:mc="http://schemas.openxmlformats.org/markup-compatibility/2006">
-        <mc:Choice xmlns:a14="http://schemas.microsoft.com/office/drawing/2010/main" Requires="a14">
+      <mc:AlternateContent xmlns:mc="http://schemas.openxmlformats.org/markup-compatibility/2006" xmlns:a14="http://schemas.microsoft.com/office/drawing/2010/main">
+        <mc:Choice Requires="a14">
           <p:sp>
             <p:nvSpPr>
               <p:cNvPr id="103" name="TextBox 102">
@@ -5776,7 +5751,7 @@
             </p:txBody>
           </p:sp>
         </mc:Choice>
-        <mc:Fallback>
+        <mc:Fallback xmlns="">
           <p:sp>
             <p:nvSpPr>
               <p:cNvPr id="103" name="TextBox 102">
@@ -6408,8 +6383,8 @@
           </a:fontRef>
         </p:style>
       </p:cxnSp>
-      <mc:AlternateContent xmlns:mc="http://schemas.openxmlformats.org/markup-compatibility/2006">
-        <mc:Choice xmlns:a14="http://schemas.microsoft.com/office/drawing/2010/main" Requires="a14">
+      <mc:AlternateContent xmlns:mc="http://schemas.openxmlformats.org/markup-compatibility/2006" xmlns:a14="http://schemas.microsoft.com/office/drawing/2010/main">
+        <mc:Choice Requires="a14">
           <p:sp>
             <p:nvSpPr>
               <p:cNvPr id="32" name="Rectangle 31">
@@ -6564,7 +6539,7 @@
             </p:txBody>
           </p:sp>
         </mc:Choice>
-        <mc:Fallback>
+        <mc:Fallback xmlns="">
           <p:sp>
             <p:nvSpPr>
               <p:cNvPr id="32" name="Rectangle 31">
@@ -6614,8 +6589,8 @@
           </p:sp>
         </mc:Fallback>
       </mc:AlternateContent>
-      <mc:AlternateContent xmlns:mc="http://schemas.openxmlformats.org/markup-compatibility/2006">
-        <mc:Choice xmlns:a14="http://schemas.microsoft.com/office/drawing/2010/main" Requires="a14">
+      <mc:AlternateContent xmlns:mc="http://schemas.openxmlformats.org/markup-compatibility/2006" xmlns:a14="http://schemas.microsoft.com/office/drawing/2010/main">
+        <mc:Choice Requires="a14">
           <p:sp>
             <p:nvSpPr>
               <p:cNvPr id="35" name="Rectangle 34">
@@ -6770,7 +6745,7 @@
             </p:txBody>
           </p:sp>
         </mc:Choice>
-        <mc:Fallback>
+        <mc:Fallback xmlns="">
           <p:sp>
             <p:nvSpPr>
               <p:cNvPr id="35" name="Rectangle 34">
@@ -6820,8 +6795,8 @@
           </p:sp>
         </mc:Fallback>
       </mc:AlternateContent>
-      <mc:AlternateContent xmlns:mc="http://schemas.openxmlformats.org/markup-compatibility/2006">
-        <mc:Choice xmlns:a14="http://schemas.microsoft.com/office/drawing/2010/main" Requires="a14">
+      <mc:AlternateContent xmlns:mc="http://schemas.openxmlformats.org/markup-compatibility/2006" xmlns:a14="http://schemas.microsoft.com/office/drawing/2010/main">
+        <mc:Choice Requires="a14">
           <p:sp>
             <p:nvSpPr>
               <p:cNvPr id="36" name="Rectangle 35">
@@ -6976,7 +6951,7 @@
             </p:txBody>
           </p:sp>
         </mc:Choice>
-        <mc:Fallback>
+        <mc:Fallback xmlns="">
           <p:sp>
             <p:nvSpPr>
               <p:cNvPr id="36" name="Rectangle 35">
@@ -7026,8 +7001,8 @@
           </p:sp>
         </mc:Fallback>
       </mc:AlternateContent>
-      <mc:AlternateContent xmlns:mc="http://schemas.openxmlformats.org/markup-compatibility/2006">
-        <mc:Choice xmlns:a14="http://schemas.microsoft.com/office/drawing/2010/main" Requires="a14">
+      <mc:AlternateContent xmlns:mc="http://schemas.openxmlformats.org/markup-compatibility/2006" xmlns:a14="http://schemas.microsoft.com/office/drawing/2010/main">
+        <mc:Choice Requires="a14">
           <p:sp>
             <p:nvSpPr>
               <p:cNvPr id="37" name="Rectangle 36">
@@ -7182,7 +7157,7 @@
             </p:txBody>
           </p:sp>
         </mc:Choice>
-        <mc:Fallback>
+        <mc:Fallback xmlns="">
           <p:sp>
             <p:nvSpPr>
               <p:cNvPr id="37" name="Rectangle 36">
@@ -7495,8 +7470,8 @@
           </a:fontRef>
         </p:style>
       </p:cxnSp>
-      <mc:AlternateContent xmlns:mc="http://schemas.openxmlformats.org/markup-compatibility/2006">
-        <mc:Choice xmlns:a14="http://schemas.microsoft.com/office/drawing/2010/main" Requires="a14">
+      <mc:AlternateContent xmlns:mc="http://schemas.openxmlformats.org/markup-compatibility/2006" xmlns:a14="http://schemas.microsoft.com/office/drawing/2010/main">
+        <mc:Choice Requires="a14">
           <p:sp>
             <p:nvSpPr>
               <p:cNvPr id="55" name="Rectangle 54">
@@ -7651,7 +7626,7 @@
             </p:txBody>
           </p:sp>
         </mc:Choice>
-        <mc:Fallback>
+        <mc:Fallback xmlns="">
           <p:sp>
             <p:nvSpPr>
               <p:cNvPr id="55" name="Rectangle 54">
@@ -7701,8 +7676,8 @@
           </p:sp>
         </mc:Fallback>
       </mc:AlternateContent>
-      <mc:AlternateContent xmlns:mc="http://schemas.openxmlformats.org/markup-compatibility/2006">
-        <mc:Choice xmlns:a14="http://schemas.microsoft.com/office/drawing/2010/main" Requires="a14">
+      <mc:AlternateContent xmlns:mc="http://schemas.openxmlformats.org/markup-compatibility/2006" xmlns:a14="http://schemas.microsoft.com/office/drawing/2010/main">
+        <mc:Choice Requires="a14">
           <p:sp>
             <p:nvSpPr>
               <p:cNvPr id="56" name="Rectangle 55">
@@ -7857,7 +7832,7 @@
             </p:txBody>
           </p:sp>
         </mc:Choice>
-        <mc:Fallback>
+        <mc:Fallback xmlns="">
           <p:sp>
             <p:nvSpPr>
               <p:cNvPr id="56" name="Rectangle 55">
@@ -7907,8 +7882,8 @@
           </p:sp>
         </mc:Fallback>
       </mc:AlternateContent>
-      <mc:AlternateContent xmlns:mc="http://schemas.openxmlformats.org/markup-compatibility/2006">
-        <mc:Choice xmlns:a14="http://schemas.microsoft.com/office/drawing/2010/main" Requires="a14">
+      <mc:AlternateContent xmlns:mc="http://schemas.openxmlformats.org/markup-compatibility/2006" xmlns:a14="http://schemas.microsoft.com/office/drawing/2010/main">
+        <mc:Choice Requires="a14">
           <p:sp>
             <p:nvSpPr>
               <p:cNvPr id="60" name="Rectangle 59">
@@ -8063,7 +8038,7 @@
             </p:txBody>
           </p:sp>
         </mc:Choice>
-        <mc:Fallback>
+        <mc:Fallback xmlns="">
           <p:sp>
             <p:nvSpPr>
               <p:cNvPr id="60" name="Rectangle 59">
@@ -8113,8 +8088,8 @@
           </p:sp>
         </mc:Fallback>
       </mc:AlternateContent>
-      <mc:AlternateContent xmlns:mc="http://schemas.openxmlformats.org/markup-compatibility/2006">
-        <mc:Choice xmlns:a14="http://schemas.microsoft.com/office/drawing/2010/main" Requires="a14">
+      <mc:AlternateContent xmlns:mc="http://schemas.openxmlformats.org/markup-compatibility/2006" xmlns:a14="http://schemas.microsoft.com/office/drawing/2010/main">
+        <mc:Choice Requires="a14">
           <p:sp>
             <p:nvSpPr>
               <p:cNvPr id="61" name="Rectangle 60">
@@ -8269,7 +8244,7 @@
             </p:txBody>
           </p:sp>
         </mc:Choice>
-        <mc:Fallback>
+        <mc:Fallback xmlns="">
           <p:sp>
             <p:nvSpPr>
               <p:cNvPr id="61" name="Rectangle 60">
@@ -8582,8 +8557,8 @@
           </a:p>
         </p:txBody>
       </p:sp>
-      <mc:AlternateContent xmlns:mc="http://schemas.openxmlformats.org/markup-compatibility/2006">
-        <mc:Choice xmlns:a14="http://schemas.microsoft.com/office/drawing/2010/main" Requires="a14">
+      <mc:AlternateContent xmlns:mc="http://schemas.openxmlformats.org/markup-compatibility/2006" xmlns:a14="http://schemas.microsoft.com/office/drawing/2010/main">
+        <mc:Choice Requires="a14">
           <p:sp>
             <p:nvSpPr>
               <p:cNvPr id="72" name="Rectangle 71">
@@ -8738,7 +8713,7 @@
             </p:txBody>
           </p:sp>
         </mc:Choice>
-        <mc:Fallback>
+        <mc:Fallback xmlns="">
           <p:sp>
             <p:nvSpPr>
               <p:cNvPr id="72" name="Rectangle 71">
@@ -8788,8 +8763,8 @@
           </p:sp>
         </mc:Fallback>
       </mc:AlternateContent>
-      <mc:AlternateContent xmlns:mc="http://schemas.openxmlformats.org/markup-compatibility/2006">
-        <mc:Choice xmlns:a14="http://schemas.microsoft.com/office/drawing/2010/main" Requires="a14">
+      <mc:AlternateContent xmlns:mc="http://schemas.openxmlformats.org/markup-compatibility/2006" xmlns:a14="http://schemas.microsoft.com/office/drawing/2010/main">
+        <mc:Choice Requires="a14">
           <p:sp>
             <p:nvSpPr>
               <p:cNvPr id="73" name="Rectangle 72">
@@ -8944,7 +8919,7 @@
             </p:txBody>
           </p:sp>
         </mc:Choice>
-        <mc:Fallback>
+        <mc:Fallback xmlns="">
           <p:sp>
             <p:nvSpPr>
               <p:cNvPr id="73" name="Rectangle 72">
@@ -8994,8 +8969,8 @@
           </p:sp>
         </mc:Fallback>
       </mc:AlternateContent>
-      <mc:AlternateContent xmlns:mc="http://schemas.openxmlformats.org/markup-compatibility/2006">
-        <mc:Choice xmlns:a14="http://schemas.microsoft.com/office/drawing/2010/main" Requires="a14">
+      <mc:AlternateContent xmlns:mc="http://schemas.openxmlformats.org/markup-compatibility/2006" xmlns:a14="http://schemas.microsoft.com/office/drawing/2010/main">
+        <mc:Choice Requires="a14">
           <p:sp>
             <p:nvSpPr>
               <p:cNvPr id="74" name="Rectangle 73">
@@ -9150,7 +9125,7 @@
             </p:txBody>
           </p:sp>
         </mc:Choice>
-        <mc:Fallback>
+        <mc:Fallback xmlns="">
           <p:sp>
             <p:nvSpPr>
               <p:cNvPr id="74" name="Rectangle 73">
@@ -9200,8 +9175,8 @@
           </p:sp>
         </mc:Fallback>
       </mc:AlternateContent>
-      <mc:AlternateContent xmlns:mc="http://schemas.openxmlformats.org/markup-compatibility/2006">
-        <mc:Choice xmlns:a14="http://schemas.microsoft.com/office/drawing/2010/main" Requires="a14">
+      <mc:AlternateContent xmlns:mc="http://schemas.openxmlformats.org/markup-compatibility/2006" xmlns:a14="http://schemas.microsoft.com/office/drawing/2010/main">
+        <mc:Choice Requires="a14">
           <p:sp>
             <p:nvSpPr>
               <p:cNvPr id="75" name="Rectangle 74">
@@ -9356,7 +9331,7 @@
             </p:txBody>
           </p:sp>
         </mc:Choice>
-        <mc:Fallback>
+        <mc:Fallback xmlns="">
           <p:sp>
             <p:nvSpPr>
               <p:cNvPr id="75" name="Rectangle 74">
@@ -9917,8 +9892,8 @@
           </a:fontRef>
         </p:style>
       </p:cxnSp>
-      <mc:AlternateContent xmlns:mc="http://schemas.openxmlformats.org/markup-compatibility/2006">
-        <mc:Choice xmlns:a14="http://schemas.microsoft.com/office/drawing/2010/main" Requires="a14">
+      <mc:AlternateContent xmlns:mc="http://schemas.openxmlformats.org/markup-compatibility/2006" xmlns:a14="http://schemas.microsoft.com/office/drawing/2010/main">
+        <mc:Choice Requires="a14">
           <p:sp>
             <p:nvSpPr>
               <p:cNvPr id="22" name="Rectangle 21">
@@ -10073,7 +10048,7 @@
             </p:txBody>
           </p:sp>
         </mc:Choice>
-        <mc:Fallback>
+        <mc:Fallback xmlns="">
           <p:sp>
             <p:nvSpPr>
               <p:cNvPr id="22" name="Rectangle 21">
@@ -10123,8 +10098,8 @@
           </p:sp>
         </mc:Fallback>
       </mc:AlternateContent>
-      <mc:AlternateContent xmlns:mc="http://schemas.openxmlformats.org/markup-compatibility/2006">
-        <mc:Choice xmlns:a14="http://schemas.microsoft.com/office/drawing/2010/main" Requires="a14">
+      <mc:AlternateContent xmlns:mc="http://schemas.openxmlformats.org/markup-compatibility/2006" xmlns:a14="http://schemas.microsoft.com/office/drawing/2010/main">
+        <mc:Choice Requires="a14">
           <p:sp>
             <p:nvSpPr>
               <p:cNvPr id="23" name="Rectangle 22">
@@ -10279,7 +10254,7 @@
             </p:txBody>
           </p:sp>
         </mc:Choice>
-        <mc:Fallback>
+        <mc:Fallback xmlns="">
           <p:sp>
             <p:nvSpPr>
               <p:cNvPr id="23" name="Rectangle 22">
@@ -10329,8 +10304,8 @@
           </p:sp>
         </mc:Fallback>
       </mc:AlternateContent>
-      <mc:AlternateContent xmlns:mc="http://schemas.openxmlformats.org/markup-compatibility/2006">
-        <mc:Choice xmlns:a14="http://schemas.microsoft.com/office/drawing/2010/main" Requires="a14">
+      <mc:AlternateContent xmlns:mc="http://schemas.openxmlformats.org/markup-compatibility/2006" xmlns:a14="http://schemas.microsoft.com/office/drawing/2010/main">
+        <mc:Choice Requires="a14">
           <p:sp>
             <p:nvSpPr>
               <p:cNvPr id="25" name="Rectangle 24">
@@ -10485,7 +10460,7 @@
             </p:txBody>
           </p:sp>
         </mc:Choice>
-        <mc:Fallback>
+        <mc:Fallback xmlns="">
           <p:sp>
             <p:nvSpPr>
               <p:cNvPr id="25" name="Rectangle 24">
@@ -10758,8 +10733,8 @@
           </a:p>
         </p:txBody>
       </p:sp>
-      <mc:AlternateContent xmlns:mc="http://schemas.openxmlformats.org/markup-compatibility/2006">
-        <mc:Choice xmlns:a14="http://schemas.microsoft.com/office/drawing/2010/main" Requires="a14">
+      <mc:AlternateContent xmlns:mc="http://schemas.openxmlformats.org/markup-compatibility/2006" xmlns:a14="http://schemas.microsoft.com/office/drawing/2010/main">
+        <mc:Choice Requires="a14">
           <p:sp>
             <p:nvSpPr>
               <p:cNvPr id="88" name="Rectangle 87">
@@ -10914,7 +10889,7 @@
             </p:txBody>
           </p:sp>
         </mc:Choice>
-        <mc:Fallback>
+        <mc:Fallback xmlns="">
           <p:sp>
             <p:nvSpPr>
               <p:cNvPr id="88" name="Rectangle 87">
@@ -10964,8 +10939,8 @@
           </p:sp>
         </mc:Fallback>
       </mc:AlternateContent>
-      <mc:AlternateContent xmlns:mc="http://schemas.openxmlformats.org/markup-compatibility/2006">
-        <mc:Choice xmlns:a14="http://schemas.microsoft.com/office/drawing/2010/main" Requires="a14">
+      <mc:AlternateContent xmlns:mc="http://schemas.openxmlformats.org/markup-compatibility/2006" xmlns:a14="http://schemas.microsoft.com/office/drawing/2010/main">
+        <mc:Choice Requires="a14">
           <p:sp>
             <p:nvSpPr>
               <p:cNvPr id="93" name="Rectangle 92">
@@ -11046,7 +11021,7 @@
             </p:txBody>
           </p:sp>
         </mc:Choice>
-        <mc:Fallback>
+        <mc:Fallback xmlns="">
           <p:sp>
             <p:nvSpPr>
               <p:cNvPr id="93" name="Rectangle 92">
@@ -11096,8 +11071,8 @@
           </p:sp>
         </mc:Fallback>
       </mc:AlternateContent>
-      <mc:AlternateContent xmlns:mc="http://schemas.openxmlformats.org/markup-compatibility/2006">
-        <mc:Choice xmlns:a14="http://schemas.microsoft.com/office/drawing/2010/main" Requires="a14">
+      <mc:AlternateContent xmlns:mc="http://schemas.openxmlformats.org/markup-compatibility/2006" xmlns:a14="http://schemas.microsoft.com/office/drawing/2010/main">
+        <mc:Choice Requires="a14">
           <p:sp>
             <p:nvSpPr>
               <p:cNvPr id="99" name="Rectangle 98">
@@ -11182,7 +11157,7 @@
             </p:txBody>
           </p:sp>
         </mc:Choice>
-        <mc:Fallback>
+        <mc:Fallback xmlns="">
           <p:sp>
             <p:nvSpPr>
               <p:cNvPr id="99" name="Rectangle 98">
@@ -11775,8 +11750,8 @@
           </a:p>
         </p:txBody>
       </p:sp>
-      <mc:AlternateContent xmlns:mc="http://schemas.openxmlformats.org/markup-compatibility/2006">
-        <mc:Choice xmlns:a14="http://schemas.microsoft.com/office/drawing/2010/main" Requires="a14">
+      <mc:AlternateContent xmlns:mc="http://schemas.openxmlformats.org/markup-compatibility/2006" xmlns:a14="http://schemas.microsoft.com/office/drawing/2010/main">
+        <mc:Choice Requires="a14">
           <p:sp>
             <p:nvSpPr>
               <p:cNvPr id="125" name="Rectangle 124">
@@ -11857,7 +11832,7 @@
             </p:txBody>
           </p:sp>
         </mc:Choice>
-        <mc:Fallback>
+        <mc:Fallback xmlns="">
           <p:sp>
             <p:nvSpPr>
               <p:cNvPr id="125" name="Rectangle 124">
@@ -11960,8 +11935,8 @@
           </a:p>
         </p:txBody>
       </p:sp>
-      <mc:AlternateContent xmlns:mc="http://schemas.openxmlformats.org/markup-compatibility/2006">
-        <mc:Choice xmlns:a14="http://schemas.microsoft.com/office/drawing/2010/main" Requires="a14">
+      <mc:AlternateContent xmlns:mc="http://schemas.openxmlformats.org/markup-compatibility/2006" xmlns:a14="http://schemas.microsoft.com/office/drawing/2010/main">
+        <mc:Choice Requires="a14">
           <p:sp>
             <p:nvSpPr>
               <p:cNvPr id="127" name="TextBox 126">
@@ -11991,7 +11966,7 @@
               <a:lstStyle/>
               <a:p>
                 <a:r>
-                  <a:rPr lang="vi-VN" sz="1400">
+                  <a:rPr lang="vi-VN" sz="1400" b="1">
                     <a:latin typeface="Calibri" panose="020F0502020204030204" pitchFamily="34" charset="0"/>
                     <a:cs typeface="Calibri" panose="020F0502020204030204" pitchFamily="34" charset="0"/>
                   </a:rPr>
@@ -12059,7 +12034,19 @@
                       <a:rPr lang="vi-VN" sz="1400" b="0" i="1">
                         <a:latin typeface="Cambria Math" panose="02040503050406030204" pitchFamily="18" charset="0"/>
                       </a:rPr>
-                      <m:t>⟩</m:t>
+                      <m:t>(</m:t>
+                    </m:r>
+                    <m:r>
+                      <a:rPr lang="vi-VN" sz="1400" b="1" i="1">
+                        <a:latin typeface="Cambria Math" panose="02040503050406030204" pitchFamily="18" charset="0"/>
+                      </a:rPr>
+                      <m:t>𝜽</m:t>
+                    </m:r>
+                    <m:r>
+                      <a:rPr lang="vi-VN" sz="1400" b="0" i="1">
+                        <a:latin typeface="Cambria Math" panose="02040503050406030204" pitchFamily="18" charset="0"/>
+                      </a:rPr>
+                      <m:t>)⟩</m:t>
                     </m:r>
                   </m:oMath>
                 </a14:m>
@@ -12068,7 +12055,7 @@
             </p:txBody>
           </p:sp>
         </mc:Choice>
-        <mc:Fallback>
+        <mc:Fallback xmlns="">
           <p:sp>
             <p:nvSpPr>
               <p:cNvPr id="127" name="TextBox 126">
@@ -12113,8 +12100,8 @@
           </p:sp>
         </mc:Fallback>
       </mc:AlternateContent>
-      <mc:AlternateContent xmlns:mc="http://schemas.openxmlformats.org/markup-compatibility/2006">
-        <mc:Choice xmlns:a14="http://schemas.microsoft.com/office/drawing/2010/main" Requires="a14">
+      <mc:AlternateContent xmlns:mc="http://schemas.openxmlformats.org/markup-compatibility/2006" xmlns:a14="http://schemas.microsoft.com/office/drawing/2010/main">
+        <mc:Choice Requires="a14">
           <p:sp>
             <p:nvSpPr>
               <p:cNvPr id="128" name="TextBox 127">
@@ -12144,7 +12131,7 @@
               <a:lstStyle/>
               <a:p>
                 <a:r>
-                  <a:rPr lang="vi-VN" sz="1400" b="0">
+                  <a:rPr lang="vi-VN" sz="1400" b="1">
                     <a:latin typeface="Calibri" panose="020F0502020204030204" pitchFamily="34" charset="0"/>
                     <a:cs typeface="Calibri" panose="020F0502020204030204" pitchFamily="34" charset="0"/>
                   </a:rPr>
@@ -12202,7 +12189,19 @@
                       <a:rPr lang="vi-VN" sz="1400" b="0" i="1">
                         <a:latin typeface="Cambria Math" panose="02040503050406030204" pitchFamily="18" charset="0"/>
                       </a:rPr>
-                      <m:t>⟩</m:t>
+                      <m:t>(</m:t>
+                    </m:r>
+                    <m:r>
+                      <a:rPr lang="vi-VN" sz="1400" b="1" i="1">
+                        <a:latin typeface="Cambria Math" panose="02040503050406030204" pitchFamily="18" charset="0"/>
+                      </a:rPr>
+                      <m:t>𝜽</m:t>
+                    </m:r>
+                    <m:r>
+                      <a:rPr lang="vi-VN" sz="1400" b="0" i="1">
+                        <a:latin typeface="Cambria Math" panose="02040503050406030204" pitchFamily="18" charset="0"/>
+                      </a:rPr>
+                      <m:t>)⟩</m:t>
                     </m:r>
                   </m:oMath>
                 </a14:m>
@@ -12211,7 +12210,7 @@
             </p:txBody>
           </p:sp>
         </mc:Choice>
-        <mc:Fallback>
+        <mc:Fallback xmlns="">
           <p:sp>
             <p:nvSpPr>
               <p:cNvPr id="128" name="TextBox 127">
@@ -12256,8 +12255,8 @@
           </p:sp>
         </mc:Fallback>
       </mc:AlternateContent>
-      <mc:AlternateContent xmlns:mc="http://schemas.openxmlformats.org/markup-compatibility/2006">
-        <mc:Choice xmlns:a14="http://schemas.microsoft.com/office/drawing/2010/main" Requires="a14">
+      <mc:AlternateContent xmlns:mc="http://schemas.openxmlformats.org/markup-compatibility/2006" xmlns:a14="http://schemas.microsoft.com/office/drawing/2010/main">
+        <mc:Choice Requires="a14">
           <p:sp>
             <p:nvSpPr>
               <p:cNvPr id="129" name="TextBox 128">
@@ -12287,7 +12286,7 @@
               <a:lstStyle/>
               <a:p>
                 <a:r>
-                  <a:rPr lang="vi-VN" sz="1400" b="0">
+                  <a:rPr lang="vi-VN" sz="1400" b="1">
                     <a:latin typeface="Calibri" panose="020F0502020204030204" pitchFamily="34" charset="0"/>
                     <a:cs typeface="Calibri" panose="020F0502020204030204" pitchFamily="34" charset="0"/>
                   </a:rPr>
@@ -12341,6 +12340,23 @@
                         </m:r>
                       </m:sub>
                     </m:sSub>
+                    <m:d>
+                      <m:dPr>
+                        <m:ctrlPr>
+                          <a:rPr lang="vi-VN" sz="1400" b="0" i="1">
+                            <a:latin typeface="Cambria Math" panose="02040503050406030204" pitchFamily="18" charset="0"/>
+                          </a:rPr>
+                        </m:ctrlPr>
+                      </m:dPr>
+                      <m:e>
+                        <m:r>
+                          <a:rPr lang="vi-VN" sz="1400" b="1" i="1">
+                            <a:latin typeface="Cambria Math" panose="02040503050406030204" pitchFamily="18" charset="0"/>
+                          </a:rPr>
+                          <m:t>𝜽</m:t>
+                        </m:r>
+                      </m:e>
+                    </m:d>
                     <m:r>
                       <a:rPr lang="vi-VN" sz="1400" b="0" i="1">
                         <a:latin typeface="Cambria Math" panose="02040503050406030204" pitchFamily="18" charset="0"/>
@@ -12354,7 +12370,7 @@
             </p:txBody>
           </p:sp>
         </mc:Choice>
-        <mc:Fallback>
+        <mc:Fallback xmlns="">
           <p:sp>
             <p:nvSpPr>
               <p:cNvPr id="129" name="TextBox 128">
@@ -12705,8 +12721,8 @@
           </a:fontRef>
         </p:style>
       </p:cxnSp>
-      <mc:AlternateContent xmlns:mc="http://schemas.openxmlformats.org/markup-compatibility/2006">
-        <mc:Choice xmlns:a14="http://schemas.microsoft.com/office/drawing/2010/main" Requires="a14">
+      <mc:AlternateContent xmlns:mc="http://schemas.openxmlformats.org/markup-compatibility/2006" xmlns:a14="http://schemas.microsoft.com/office/drawing/2010/main">
+        <mc:Choice Requires="a14">
           <p:sp>
             <p:nvSpPr>
               <p:cNvPr id="147" name="Rectangle 146">
@@ -12864,7 +12880,7 @@
             </p:txBody>
           </p:sp>
         </mc:Choice>
-        <mc:Fallback>
+        <mc:Fallback xmlns="">
           <p:sp>
             <p:nvSpPr>
               <p:cNvPr id="147" name="Rectangle 146">
@@ -12914,8 +12930,8 @@
           </p:sp>
         </mc:Fallback>
       </mc:AlternateContent>
-      <mc:AlternateContent xmlns:mc="http://schemas.openxmlformats.org/markup-compatibility/2006">
-        <mc:Choice xmlns:a14="http://schemas.microsoft.com/office/drawing/2010/main" Requires="a14">
+      <mc:AlternateContent xmlns:mc="http://schemas.openxmlformats.org/markup-compatibility/2006" xmlns:a14="http://schemas.microsoft.com/office/drawing/2010/main">
+        <mc:Choice Requires="a14">
           <p:sp>
             <p:nvSpPr>
               <p:cNvPr id="148" name="Rectangle 147">
@@ -13073,7 +13089,7 @@
             </p:txBody>
           </p:sp>
         </mc:Choice>
-        <mc:Fallback>
+        <mc:Fallback xmlns="">
           <p:sp>
             <p:nvSpPr>
               <p:cNvPr id="148" name="Rectangle 147">
@@ -13123,8 +13139,8 @@
           </p:sp>
         </mc:Fallback>
       </mc:AlternateContent>
-      <mc:AlternateContent xmlns:mc="http://schemas.openxmlformats.org/markup-compatibility/2006">
-        <mc:Choice xmlns:a14="http://schemas.microsoft.com/office/drawing/2010/main" Requires="a14">
+      <mc:AlternateContent xmlns:mc="http://schemas.openxmlformats.org/markup-compatibility/2006" xmlns:a14="http://schemas.microsoft.com/office/drawing/2010/main">
+        <mc:Choice Requires="a14">
           <p:sp>
             <p:nvSpPr>
               <p:cNvPr id="150" name="Rectangle 149">
@@ -13282,7 +13298,7 @@
             </p:txBody>
           </p:sp>
         </mc:Choice>
-        <mc:Fallback>
+        <mc:Fallback xmlns="">
           <p:sp>
             <p:nvSpPr>
               <p:cNvPr id="150" name="Rectangle 149">
@@ -13332,8 +13348,8 @@
           </p:sp>
         </mc:Fallback>
       </mc:AlternateContent>
-      <mc:AlternateContent xmlns:mc="http://schemas.openxmlformats.org/markup-compatibility/2006">
-        <mc:Choice xmlns:a14="http://schemas.microsoft.com/office/drawing/2010/main" Requires="a14">
+      <mc:AlternateContent xmlns:mc="http://schemas.openxmlformats.org/markup-compatibility/2006" xmlns:a14="http://schemas.microsoft.com/office/drawing/2010/main">
+        <mc:Choice Requires="a14">
           <p:sp>
             <p:nvSpPr>
               <p:cNvPr id="151" name="Rectangle 150">
@@ -13491,7 +13507,7 @@
             </p:txBody>
           </p:sp>
         </mc:Choice>
-        <mc:Fallback>
+        <mc:Fallback xmlns="">
           <p:sp>
             <p:nvSpPr>
               <p:cNvPr id="151" name="Rectangle 150">
@@ -13541,8 +13557,8 @@
           </p:sp>
         </mc:Fallback>
       </mc:AlternateContent>
-      <mc:AlternateContent xmlns:mc="http://schemas.openxmlformats.org/markup-compatibility/2006">
-        <mc:Choice xmlns:a14="http://schemas.microsoft.com/office/drawing/2010/main" Requires="a14">
+      <mc:AlternateContent xmlns:mc="http://schemas.openxmlformats.org/markup-compatibility/2006" xmlns:a14="http://schemas.microsoft.com/office/drawing/2010/main">
+        <mc:Choice Requires="a14">
           <p:sp>
             <p:nvSpPr>
               <p:cNvPr id="158" name="Rectangle 157">
@@ -13700,7 +13716,7 @@
             </p:txBody>
           </p:sp>
         </mc:Choice>
-        <mc:Fallback>
+        <mc:Fallback xmlns="">
           <p:sp>
             <p:nvSpPr>
               <p:cNvPr id="158" name="Rectangle 157">
@@ -13750,8 +13766,8 @@
           </p:sp>
         </mc:Fallback>
       </mc:AlternateContent>
-      <mc:AlternateContent xmlns:mc="http://schemas.openxmlformats.org/markup-compatibility/2006">
-        <mc:Choice xmlns:a14="http://schemas.microsoft.com/office/drawing/2010/main" Requires="a14">
+      <mc:AlternateContent xmlns:mc="http://schemas.openxmlformats.org/markup-compatibility/2006" xmlns:a14="http://schemas.microsoft.com/office/drawing/2010/main">
+        <mc:Choice Requires="a14">
           <p:sp>
             <p:nvSpPr>
               <p:cNvPr id="159" name="Rectangle 158">
@@ -13909,7 +13925,7 @@
             </p:txBody>
           </p:sp>
         </mc:Choice>
-        <mc:Fallback>
+        <mc:Fallback xmlns="">
           <p:sp>
             <p:nvSpPr>
               <p:cNvPr id="159" name="Rectangle 158">
@@ -13959,8 +13975,8 @@
           </p:sp>
         </mc:Fallback>
       </mc:AlternateContent>
-      <mc:AlternateContent xmlns:mc="http://schemas.openxmlformats.org/markup-compatibility/2006">
-        <mc:Choice xmlns:a14="http://schemas.microsoft.com/office/drawing/2010/main" Requires="a14">
+      <mc:AlternateContent xmlns:mc="http://schemas.openxmlformats.org/markup-compatibility/2006" xmlns:a14="http://schemas.microsoft.com/office/drawing/2010/main">
+        <mc:Choice Requires="a14">
           <p:sp>
             <p:nvSpPr>
               <p:cNvPr id="160" name="Rectangle 159">
@@ -14118,7 +14134,7 @@
             </p:txBody>
           </p:sp>
         </mc:Choice>
-        <mc:Fallback>
+        <mc:Fallback xmlns="">
           <p:sp>
             <p:nvSpPr>
               <p:cNvPr id="160" name="Rectangle 159">
@@ -14168,8 +14184,8 @@
           </p:sp>
         </mc:Fallback>
       </mc:AlternateContent>
-      <mc:AlternateContent xmlns:mc="http://schemas.openxmlformats.org/markup-compatibility/2006">
-        <mc:Choice xmlns:a14="http://schemas.microsoft.com/office/drawing/2010/main" Requires="a14">
+      <mc:AlternateContent xmlns:mc="http://schemas.openxmlformats.org/markup-compatibility/2006" xmlns:a14="http://schemas.microsoft.com/office/drawing/2010/main">
+        <mc:Choice Requires="a14">
           <p:sp>
             <p:nvSpPr>
               <p:cNvPr id="161" name="Rectangle 160">
@@ -14327,7 +14343,7 @@
             </p:txBody>
           </p:sp>
         </mc:Choice>
-        <mc:Fallback>
+        <mc:Fallback xmlns="">
           <p:sp>
             <p:nvSpPr>
               <p:cNvPr id="161" name="Rectangle 160">
@@ -14377,8 +14393,8 @@
           </p:sp>
         </mc:Fallback>
       </mc:AlternateContent>
-      <mc:AlternateContent xmlns:mc="http://schemas.openxmlformats.org/markup-compatibility/2006">
-        <mc:Choice xmlns:a14="http://schemas.microsoft.com/office/drawing/2010/main" Requires="a14">
+      <mc:AlternateContent xmlns:mc="http://schemas.openxmlformats.org/markup-compatibility/2006" xmlns:a14="http://schemas.microsoft.com/office/drawing/2010/main">
+        <mc:Choice Requires="a14">
           <p:sp>
             <p:nvSpPr>
               <p:cNvPr id="170" name="Rectangle 169">
@@ -14536,7 +14552,7 @@
             </p:txBody>
           </p:sp>
         </mc:Choice>
-        <mc:Fallback>
+        <mc:Fallback xmlns="">
           <p:sp>
             <p:nvSpPr>
               <p:cNvPr id="170" name="Rectangle 169">
@@ -14586,8 +14602,8 @@
           </p:sp>
         </mc:Fallback>
       </mc:AlternateContent>
-      <mc:AlternateContent xmlns:mc="http://schemas.openxmlformats.org/markup-compatibility/2006">
-        <mc:Choice xmlns:a14="http://schemas.microsoft.com/office/drawing/2010/main" Requires="a14">
+      <mc:AlternateContent xmlns:mc="http://schemas.openxmlformats.org/markup-compatibility/2006" xmlns:a14="http://schemas.microsoft.com/office/drawing/2010/main">
+        <mc:Choice Requires="a14">
           <p:sp>
             <p:nvSpPr>
               <p:cNvPr id="171" name="Rectangle 170">
@@ -14745,7 +14761,7 @@
             </p:txBody>
           </p:sp>
         </mc:Choice>
-        <mc:Fallback>
+        <mc:Fallback xmlns="">
           <p:sp>
             <p:nvSpPr>
               <p:cNvPr id="171" name="Rectangle 170">
@@ -14795,8 +14811,8 @@
           </p:sp>
         </mc:Fallback>
       </mc:AlternateContent>
-      <mc:AlternateContent xmlns:mc="http://schemas.openxmlformats.org/markup-compatibility/2006">
-        <mc:Choice xmlns:a14="http://schemas.microsoft.com/office/drawing/2010/main" Requires="a14">
+      <mc:AlternateContent xmlns:mc="http://schemas.openxmlformats.org/markup-compatibility/2006" xmlns:a14="http://schemas.microsoft.com/office/drawing/2010/main">
+        <mc:Choice Requires="a14">
           <p:sp>
             <p:nvSpPr>
               <p:cNvPr id="172" name="Rectangle 171">
@@ -14954,7 +14970,7 @@
             </p:txBody>
           </p:sp>
         </mc:Choice>
-        <mc:Fallback>
+        <mc:Fallback xmlns="">
           <p:sp>
             <p:nvSpPr>
               <p:cNvPr id="172" name="Rectangle 171">
@@ -15004,8 +15020,8 @@
           </p:sp>
         </mc:Fallback>
       </mc:AlternateContent>
-      <mc:AlternateContent xmlns:mc="http://schemas.openxmlformats.org/markup-compatibility/2006">
-        <mc:Choice xmlns:a14="http://schemas.microsoft.com/office/drawing/2010/main" Requires="a14">
+      <mc:AlternateContent xmlns:mc="http://schemas.openxmlformats.org/markup-compatibility/2006" xmlns:a14="http://schemas.microsoft.com/office/drawing/2010/main">
+        <mc:Choice Requires="a14">
           <p:sp>
             <p:nvSpPr>
               <p:cNvPr id="173" name="Rectangle 172">
@@ -15163,7 +15179,7 @@
             </p:txBody>
           </p:sp>
         </mc:Choice>
-        <mc:Fallback>
+        <mc:Fallback xmlns="">
           <p:sp>
             <p:nvSpPr>
               <p:cNvPr id="173" name="Rectangle 172">
@@ -15266,8 +15282,8 @@
           </a:p>
         </p:txBody>
       </p:sp>
-      <mc:AlternateContent xmlns:mc="http://schemas.openxmlformats.org/markup-compatibility/2006">
-        <mc:Choice xmlns:a14="http://schemas.microsoft.com/office/drawing/2010/main" Requires="a14">
+      <mc:AlternateContent xmlns:mc="http://schemas.openxmlformats.org/markup-compatibility/2006" xmlns:a14="http://schemas.microsoft.com/office/drawing/2010/main">
+        <mc:Choice Requires="a14">
           <p:sp>
             <p:nvSpPr>
               <p:cNvPr id="180" name="TextBox 179">
@@ -15297,18 +15313,11 @@
               <a:lstStyle/>
               <a:p>
                 <a:r>
-                  <a:rPr lang="vi-VN" sz="1400">
+                  <a:rPr lang="vi-VN" sz="1400" b="1">
                     <a:latin typeface="Calibri" panose="020F0502020204030204" pitchFamily="34" charset="0"/>
                     <a:cs typeface="Calibri" panose="020F0502020204030204" pitchFamily="34" charset="0"/>
                   </a:rPr>
-                  <a:t>(e</a:t>
-                </a:r>
-                <a:r>
-                  <a:rPr lang="vi-VN" sz="1400" b="0">
-                    <a:latin typeface="Calibri" panose="020F0502020204030204" pitchFamily="34" charset="0"/>
-                    <a:cs typeface="Calibri" panose="020F0502020204030204" pitchFamily="34" charset="0"/>
-                  </a:rPr>
-                  <a:t>) </a:t>
+                  <a:t>(e) </a:t>
                 </a:r>
                 <a14:m>
                   <m:oMath xmlns:m="http://schemas.openxmlformats.org/officeDocument/2006/math">
@@ -15324,6 +15333,23 @@
                       </a:rPr>
                       <m:t>𝑍𝑋𝑍</m:t>
                     </m:r>
+                    <m:d>
+                      <m:dPr>
+                        <m:ctrlPr>
+                          <a:rPr lang="vi-VN" sz="1400" b="0" i="1">
+                            <a:latin typeface="Cambria Math" panose="02040503050406030204" pitchFamily="18" charset="0"/>
+                          </a:rPr>
+                        </m:ctrlPr>
+                      </m:dPr>
+                      <m:e>
+                        <m:r>
+                          <a:rPr lang="vi-VN" sz="1400" b="1" i="1">
+                            <a:latin typeface="Cambria Math" panose="02040503050406030204" pitchFamily="18" charset="0"/>
+                          </a:rPr>
+                          <m:t>𝜽</m:t>
+                        </m:r>
+                      </m:e>
+                    </m:d>
                     <m:r>
                       <a:rPr lang="vi-VN" sz="1400" b="0" i="1">
                         <a:latin typeface="Cambria Math" panose="02040503050406030204" pitchFamily="18" charset="0"/>
@@ -15337,7 +15363,7 @@
             </p:txBody>
           </p:sp>
         </mc:Choice>
-        <mc:Fallback>
+        <mc:Fallback xmlns="">
           <p:sp>
             <p:nvSpPr>
               <p:cNvPr id="180" name="TextBox 179">
@@ -15429,6 +15455,16 @@
           <a:p>
             <a:pPr algn="ctr"/>
             <a:r>
+              <a:rPr lang="en-US" sz="1400" b="1" dirty="0">
+                <a:solidFill>
+                  <a:schemeClr val="tx1"/>
+                </a:solidFill>
+                <a:latin typeface="Calibri" panose="020F0502020204030204" pitchFamily="34" charset="0"/>
+                <a:cs typeface="Calibri" panose="020F0502020204030204" pitchFamily="34" charset="0"/>
+              </a:rPr>
+              <a:t>(a) </a:t>
+            </a:r>
+            <a:r>
               <a:rPr lang="en-US" sz="1400" dirty="0">
                 <a:solidFill>
                   <a:schemeClr val="tx1"/>
@@ -15436,7 +15472,7 @@
                 <a:latin typeface="Calibri" panose="020F0502020204030204" pitchFamily="34" charset="0"/>
                 <a:cs typeface="Calibri" panose="020F0502020204030204" pitchFamily="34" charset="0"/>
               </a:rPr>
-              <a:t>(a) Parameterized quantum circuit</a:t>
+              <a:t>Parameterized quantum circuit</a:t>
             </a:r>
             <a:endParaRPr lang="en-CA" sz="1400" dirty="0">
               <a:solidFill>
@@ -15855,8 +15891,8 @@
           </a:fontRef>
         </p:style>
       </p:cxnSp>
-      <mc:AlternateContent xmlns:mc="http://schemas.openxmlformats.org/markup-compatibility/2006">
-        <mc:Choice xmlns:a14="http://schemas.microsoft.com/office/drawing/2010/main" Requires="a14">
+      <mc:AlternateContent xmlns:mc="http://schemas.openxmlformats.org/markup-compatibility/2006" xmlns:a14="http://schemas.microsoft.com/office/drawing/2010/main">
+        <mc:Choice Requires="a14">
           <p:sp>
             <p:nvSpPr>
               <p:cNvPr id="3" name="Rectangle 2">
@@ -15937,7 +15973,7 @@
             </p:txBody>
           </p:sp>
         </mc:Choice>
-        <mc:Fallback>
+        <mc:Fallback xmlns="">
           <p:sp>
             <p:nvSpPr>
               <p:cNvPr id="3" name="Rectangle 2">
@@ -16137,8 +16173,8 @@
           </a:p>
         </p:txBody>
       </p:sp>
-      <mc:AlternateContent xmlns:mc="http://schemas.openxmlformats.org/markup-compatibility/2006">
-        <mc:Choice xmlns:a14="http://schemas.microsoft.com/office/drawing/2010/main" Requires="a14">
+      <mc:AlternateContent xmlns:mc="http://schemas.openxmlformats.org/markup-compatibility/2006" xmlns:a14="http://schemas.microsoft.com/office/drawing/2010/main">
+        <mc:Choice Requires="a14">
           <p:sp>
             <p:nvSpPr>
               <p:cNvPr id="142" name="TextBox 141">
@@ -16194,7 +16230,7 @@
             </p:txBody>
           </p:sp>
         </mc:Choice>
-        <mc:Fallback>
+        <mc:Fallback xmlns="">
           <p:sp>
             <p:nvSpPr>
               <p:cNvPr id="142" name="TextBox 141">
@@ -16296,8 +16332,8 @@
           </a:p>
         </p:txBody>
       </p:sp>
-      <mc:AlternateContent xmlns:mc="http://schemas.openxmlformats.org/markup-compatibility/2006">
-        <mc:Choice xmlns:a14="http://schemas.microsoft.com/office/drawing/2010/main" Requires="a14">
+      <mc:AlternateContent xmlns:mc="http://schemas.openxmlformats.org/markup-compatibility/2006" xmlns:a14="http://schemas.microsoft.com/office/drawing/2010/main">
+        <mc:Choice Requires="a14">
           <p:sp>
             <p:nvSpPr>
               <p:cNvPr id="45" name="Rectangle 44">
@@ -16374,7 +16410,7 @@
             </p:txBody>
           </p:sp>
         </mc:Choice>
-        <mc:Fallback>
+        <mc:Fallback xmlns="">
           <p:sp>
             <p:nvSpPr>
               <p:cNvPr id="45" name="Rectangle 44">
@@ -16551,8 +16587,8 @@
           </a:p>
         </p:txBody>
       </p:sp>
-      <mc:AlternateContent xmlns:mc="http://schemas.openxmlformats.org/markup-compatibility/2006">
-        <mc:Choice xmlns:a14="http://schemas.microsoft.com/office/drawing/2010/main" Requires="a14">
+      <mc:AlternateContent xmlns:mc="http://schemas.openxmlformats.org/markup-compatibility/2006" xmlns:a14="http://schemas.microsoft.com/office/drawing/2010/main">
+        <mc:Choice Requires="a14">
           <p:sp>
             <p:nvSpPr>
               <p:cNvPr id="174" name="TextBox 173">
@@ -16608,7 +16644,7 @@
             </p:txBody>
           </p:sp>
         </mc:Choice>
-        <mc:Fallback>
+        <mc:Fallback xmlns="">
           <p:sp>
             <p:nvSpPr>
               <p:cNvPr id="174" name="TextBox 173">
@@ -16653,439 +16689,6 @@
           </p:sp>
         </mc:Fallback>
       </mc:AlternateContent>
-      <p:sp>
-        <p:nvSpPr>
-          <p:cNvPr id="189" name="TextBox 188">
-            <a:extLst>
-              <a:ext uri="{FF2B5EF4-FFF2-40B4-BE49-F238E27FC236}">
-                <a16:creationId xmlns:a16="http://schemas.microsoft.com/office/drawing/2014/main" id="{5C31B01C-EBD2-AE69-6634-54230810972D}"/>
-              </a:ext>
-            </a:extLst>
-          </p:cNvPr>
-          <p:cNvSpPr txBox="1"/>
-          <p:nvPr/>
-        </p:nvSpPr>
-        <p:spPr>
-          <a:xfrm>
-            <a:off x="2732085" y="5804899"/>
-            <a:ext cx="1854861" cy="369332"/>
-          </a:xfrm>
-          <a:prstGeom prst="rect">
-            <a:avLst/>
-          </a:prstGeom>
-          <a:noFill/>
-        </p:spPr>
-        <p:txBody>
-          <a:bodyPr wrap="square" rtlCol="0">
-            <a:spAutoFit/>
-          </a:bodyPr>
-          <a:lstStyle/>
-          <a:p>
-            <a:r>
-              <a:rPr lang="en-VN">
-                <a:latin typeface="Times New Roman" panose="02020603050405020304" pitchFamily="18" charset="0"/>
-                <a:cs typeface="Times New Roman" panose="02020603050405020304" pitchFamily="18" charset="0"/>
-              </a:rPr>
-              <a:t>GD+QNG-*-GD</a:t>
-            </a:r>
-          </a:p>
-        </p:txBody>
-      </p:sp>
-      <p:cxnSp>
-        <p:nvCxnSpPr>
-          <p:cNvPr id="191" name="Straight Arrow Connector 190">
-            <a:extLst>
-              <a:ext uri="{FF2B5EF4-FFF2-40B4-BE49-F238E27FC236}">
-                <a16:creationId xmlns:a16="http://schemas.microsoft.com/office/drawing/2014/main" id="{070A6F54-D789-A3F1-1FB0-3341C8215248}"/>
-              </a:ext>
-            </a:extLst>
-          </p:cNvPr>
-          <p:cNvCxnSpPr>
-            <a:cxnSpLocks/>
-          </p:cNvCxnSpPr>
-          <p:nvPr/>
-        </p:nvCxnSpPr>
-        <p:spPr>
-          <a:xfrm flipH="1" flipV="1">
-            <a:off x="2052656" y="5721957"/>
-            <a:ext cx="204857" cy="118340"/>
-          </a:xfrm>
-          <a:prstGeom prst="straightConnector1">
-            <a:avLst/>
-          </a:prstGeom>
-          <a:ln>
-            <a:tailEnd type="triangle"/>
-          </a:ln>
-        </p:spPr>
-        <p:style>
-          <a:lnRef idx="2">
-            <a:schemeClr val="dk1"/>
-          </a:lnRef>
-          <a:fillRef idx="0">
-            <a:schemeClr val="dk1"/>
-          </a:fillRef>
-          <a:effectRef idx="1">
-            <a:schemeClr val="dk1"/>
-          </a:effectRef>
-          <a:fontRef idx="minor">
-            <a:schemeClr val="tx1"/>
-          </a:fontRef>
-        </p:style>
-      </p:cxnSp>
-      <p:sp>
-        <p:nvSpPr>
-          <p:cNvPr id="195" name="TextBox 194">
-            <a:extLst>
-              <a:ext uri="{FF2B5EF4-FFF2-40B4-BE49-F238E27FC236}">
-                <a16:creationId xmlns:a16="http://schemas.microsoft.com/office/drawing/2014/main" id="{1EF1EC04-A123-F6D5-7D53-4B505ED2A895}"/>
-              </a:ext>
-            </a:extLst>
-          </p:cNvPr>
-          <p:cNvSpPr txBox="1"/>
-          <p:nvPr/>
-        </p:nvSpPr>
-        <p:spPr>
-          <a:xfrm>
-            <a:off x="2730047" y="6145503"/>
-            <a:ext cx="2294016" cy="369332"/>
-          </a:xfrm>
-          <a:prstGeom prst="rect">
-            <a:avLst/>
-          </a:prstGeom>
-          <a:noFill/>
-        </p:spPr>
-        <p:txBody>
-          <a:bodyPr wrap="square" rtlCol="0">
-            <a:spAutoFit/>
-          </a:bodyPr>
-          <a:lstStyle/>
-          <a:p>
-            <a:r>
-              <a:rPr lang="en-VN">
-                <a:latin typeface="Times New Roman" panose="02020603050405020304" pitchFamily="18" charset="0"/>
-                <a:cs typeface="Times New Roman" panose="02020603050405020304" pitchFamily="18" charset="0"/>
-              </a:rPr>
-              <a:t>Adam+QNG-*-Adam</a:t>
-            </a:r>
-          </a:p>
-        </p:txBody>
-      </p:sp>
-      <p:cxnSp>
-        <p:nvCxnSpPr>
-          <p:cNvPr id="196" name="Straight Arrow Connector 195">
-            <a:extLst>
-              <a:ext uri="{FF2B5EF4-FFF2-40B4-BE49-F238E27FC236}">
-                <a16:creationId xmlns:a16="http://schemas.microsoft.com/office/drawing/2014/main" id="{2DD65E56-ED98-912D-7B66-8E0BE70D315E}"/>
-              </a:ext>
-            </a:extLst>
-          </p:cNvPr>
-          <p:cNvCxnSpPr>
-            <a:cxnSpLocks/>
-          </p:cNvCxnSpPr>
-          <p:nvPr/>
-        </p:nvCxnSpPr>
-        <p:spPr>
-          <a:xfrm flipH="1">
-            <a:off x="1491659" y="6475000"/>
-            <a:ext cx="560997" cy="0"/>
-          </a:xfrm>
-          <a:prstGeom prst="straightConnector1">
-            <a:avLst/>
-          </a:prstGeom>
-          <a:ln w="38100">
-            <a:tailEnd type="triangle"/>
-          </a:ln>
-        </p:spPr>
-        <p:style>
-          <a:lnRef idx="2">
-            <a:schemeClr val="dk1"/>
-          </a:lnRef>
-          <a:fillRef idx="0">
-            <a:schemeClr val="dk1"/>
-          </a:fillRef>
-          <a:effectRef idx="1">
-            <a:schemeClr val="dk1"/>
-          </a:effectRef>
-          <a:fontRef idx="minor">
-            <a:schemeClr val="tx1"/>
-          </a:fontRef>
-        </p:style>
-      </p:cxnSp>
-      <p:sp>
-        <p:nvSpPr>
-          <p:cNvPr id="198" name="TextBox 197">
-            <a:extLst>
-              <a:ext uri="{FF2B5EF4-FFF2-40B4-BE49-F238E27FC236}">
-                <a16:creationId xmlns:a16="http://schemas.microsoft.com/office/drawing/2014/main" id="{32139675-B6FD-2482-9F5F-6F1E68CC3745}"/>
-              </a:ext>
-            </a:extLst>
-          </p:cNvPr>
-          <p:cNvSpPr txBox="1"/>
-          <p:nvPr/>
-        </p:nvSpPr>
-        <p:spPr>
-          <a:xfrm>
-            <a:off x="4663684" y="5795215"/>
-            <a:ext cx="2368716" cy="369332"/>
-          </a:xfrm>
-          <a:prstGeom prst="rect">
-            <a:avLst/>
-          </a:prstGeom>
-          <a:noFill/>
-        </p:spPr>
-        <p:txBody>
-          <a:bodyPr wrap="square" rtlCol="0">
-            <a:spAutoFit/>
-          </a:bodyPr>
-          <a:lstStyle/>
-          <a:p>
-            <a:r>
-              <a:rPr lang="en-VN">
-                <a:latin typeface="Times New Roman" panose="02020603050405020304" pitchFamily="18" charset="0"/>
-                <a:cs typeface="Times New Roman" panose="02020603050405020304" pitchFamily="18" charset="0"/>
-              </a:rPr>
-              <a:t>GD+QNG-QFIM-GD</a:t>
-            </a:r>
-          </a:p>
-        </p:txBody>
-      </p:sp>
-      <p:cxnSp>
-        <p:nvCxnSpPr>
-          <p:cNvPr id="201" name="Straight Arrow Connector 200">
-            <a:extLst>
-              <a:ext uri="{FF2B5EF4-FFF2-40B4-BE49-F238E27FC236}">
-                <a16:creationId xmlns:a16="http://schemas.microsoft.com/office/drawing/2014/main" id="{CB7B70CF-1399-7F30-E440-0ABB41D2CF50}"/>
-              </a:ext>
-            </a:extLst>
-          </p:cNvPr>
-          <p:cNvCxnSpPr>
-            <a:cxnSpLocks/>
-          </p:cNvCxnSpPr>
-          <p:nvPr/>
-        </p:nvCxnSpPr>
-        <p:spPr>
-          <a:xfrm flipV="1">
-            <a:off x="7724176" y="5687897"/>
-            <a:ext cx="65517" cy="152805"/>
-          </a:xfrm>
-          <a:prstGeom prst="straightConnector1">
-            <a:avLst/>
-          </a:prstGeom>
-          <a:ln>
-            <a:tailEnd type="triangle"/>
-          </a:ln>
-        </p:spPr>
-        <p:style>
-          <a:lnRef idx="2">
-            <a:schemeClr val="dk1"/>
-          </a:lnRef>
-          <a:fillRef idx="0">
-            <a:schemeClr val="dk1"/>
-          </a:fillRef>
-          <a:effectRef idx="1">
-            <a:schemeClr val="dk1"/>
-          </a:effectRef>
-          <a:fontRef idx="minor">
-            <a:schemeClr val="tx1"/>
-          </a:fontRef>
-        </p:style>
-      </p:cxnSp>
-      <p:cxnSp>
-        <p:nvCxnSpPr>
-          <p:cNvPr id="209" name="Straight Arrow Connector 208">
-            <a:extLst>
-              <a:ext uri="{FF2B5EF4-FFF2-40B4-BE49-F238E27FC236}">
-                <a16:creationId xmlns:a16="http://schemas.microsoft.com/office/drawing/2014/main" id="{BE4E344B-5E9F-E5BB-474E-B79BD996D014}"/>
-              </a:ext>
-            </a:extLst>
-          </p:cNvPr>
-          <p:cNvCxnSpPr>
-            <a:cxnSpLocks/>
-          </p:cNvCxnSpPr>
-          <p:nvPr/>
-        </p:nvCxnSpPr>
-        <p:spPr>
-          <a:xfrm>
-            <a:off x="7870103" y="5683672"/>
-            <a:ext cx="71990" cy="156625"/>
-          </a:xfrm>
-          <a:prstGeom prst="straightConnector1">
-            <a:avLst/>
-          </a:prstGeom>
-          <a:ln>
-            <a:tailEnd type="triangle"/>
-          </a:ln>
-        </p:spPr>
-        <p:style>
-          <a:lnRef idx="2">
-            <a:schemeClr val="dk1"/>
-          </a:lnRef>
-          <a:fillRef idx="0">
-            <a:schemeClr val="dk1"/>
-          </a:fillRef>
-          <a:effectRef idx="1">
-            <a:schemeClr val="dk1"/>
-          </a:effectRef>
-          <a:fontRef idx="minor">
-            <a:schemeClr val="tx1"/>
-          </a:fontRef>
-        </p:style>
-      </p:cxnSp>
-      <p:cxnSp>
-        <p:nvCxnSpPr>
-          <p:cNvPr id="215" name="Straight Connector 214">
-            <a:extLst>
-              <a:ext uri="{FF2B5EF4-FFF2-40B4-BE49-F238E27FC236}">
-                <a16:creationId xmlns:a16="http://schemas.microsoft.com/office/drawing/2014/main" id="{7FD8FFEC-FEBF-976B-8B84-61B745DD84E4}"/>
-              </a:ext>
-            </a:extLst>
-          </p:cNvPr>
-          <p:cNvCxnSpPr/>
-          <p:nvPr/>
-        </p:nvCxnSpPr>
-        <p:spPr>
-          <a:xfrm flipH="1" flipV="1">
-            <a:off x="1950226" y="965771"/>
-            <a:ext cx="898762" cy="267128"/>
-          </a:xfrm>
-          <a:prstGeom prst="line">
-            <a:avLst/>
-          </a:prstGeom>
-        </p:spPr>
-        <p:style>
-          <a:lnRef idx="2">
-            <a:schemeClr val="accent1"/>
-          </a:lnRef>
-          <a:fillRef idx="0">
-            <a:schemeClr val="accent1"/>
-          </a:fillRef>
-          <a:effectRef idx="1">
-            <a:schemeClr val="accent1"/>
-          </a:effectRef>
-          <a:fontRef idx="minor">
-            <a:schemeClr val="tx1"/>
-          </a:fontRef>
-        </p:style>
-      </p:cxnSp>
-      <p:sp>
-        <p:nvSpPr>
-          <p:cNvPr id="217" name="TextBox 216">
-            <a:extLst>
-              <a:ext uri="{FF2B5EF4-FFF2-40B4-BE49-F238E27FC236}">
-                <a16:creationId xmlns:a16="http://schemas.microsoft.com/office/drawing/2014/main" id="{16540D4E-8C4A-506F-509B-F6321EE49235}"/>
-              </a:ext>
-            </a:extLst>
-          </p:cNvPr>
-          <p:cNvSpPr txBox="1"/>
-          <p:nvPr/>
-        </p:nvSpPr>
-        <p:spPr>
-          <a:xfrm>
-            <a:off x="6787226" y="6266937"/>
-            <a:ext cx="1434576" cy="369332"/>
-          </a:xfrm>
-          <a:prstGeom prst="rect">
-            <a:avLst/>
-          </a:prstGeom>
-          <a:noFill/>
-        </p:spPr>
-        <p:txBody>
-          <a:bodyPr wrap="square">
-            <a:spAutoFit/>
-          </a:bodyPr>
-          <a:lstStyle/>
-          <a:p>
-            <a:r>
-              <a:rPr lang="en-VN">
-                <a:latin typeface="Times New Roman" panose="02020603050405020304" pitchFamily="18" charset="0"/>
-                <a:cs typeface="Times New Roman" panose="02020603050405020304" pitchFamily="18" charset="0"/>
-              </a:rPr>
-              <a:t>QNG-*-*</a:t>
-            </a:r>
-            <a:endParaRPr lang="en-VN"/>
-          </a:p>
-        </p:txBody>
-      </p:sp>
-      <p:cxnSp>
-        <p:nvCxnSpPr>
-          <p:cNvPr id="220" name="Straight Connector 219">
-            <a:extLst>
-              <a:ext uri="{FF2B5EF4-FFF2-40B4-BE49-F238E27FC236}">
-                <a16:creationId xmlns:a16="http://schemas.microsoft.com/office/drawing/2014/main" id="{F8C8694C-EE3A-C1B0-5BEA-60E6AE32887C}"/>
-              </a:ext>
-            </a:extLst>
-          </p:cNvPr>
-          <p:cNvCxnSpPr/>
-          <p:nvPr/>
-        </p:nvCxnSpPr>
-        <p:spPr>
-          <a:xfrm flipV="1">
-            <a:off x="842481" y="1099335"/>
-            <a:ext cx="295740" cy="133564"/>
-          </a:xfrm>
-          <a:prstGeom prst="line">
-            <a:avLst/>
-          </a:prstGeom>
-          <a:ln>
-            <a:solidFill>
-              <a:srgbClr val="FF0000"/>
-            </a:solidFill>
-          </a:ln>
-        </p:spPr>
-        <p:style>
-          <a:lnRef idx="2">
-            <a:schemeClr val="accent1"/>
-          </a:lnRef>
-          <a:fillRef idx="0">
-            <a:schemeClr val="accent1"/>
-          </a:fillRef>
-          <a:effectRef idx="1">
-            <a:schemeClr val="accent1"/>
-          </a:effectRef>
-          <a:fontRef idx="minor">
-            <a:schemeClr val="tx1"/>
-          </a:fontRef>
-        </p:style>
-      </p:cxnSp>
-      <p:sp>
-        <p:nvSpPr>
-          <p:cNvPr id="221" name="TextBox 220">
-            <a:extLst>
-              <a:ext uri="{FF2B5EF4-FFF2-40B4-BE49-F238E27FC236}">
-                <a16:creationId xmlns:a16="http://schemas.microsoft.com/office/drawing/2014/main" id="{82AB0ED6-268B-7F1F-8520-E22C88011915}"/>
-              </a:ext>
-            </a:extLst>
-          </p:cNvPr>
-          <p:cNvSpPr txBox="1"/>
-          <p:nvPr/>
-        </p:nvSpPr>
-        <p:spPr>
-          <a:xfrm>
-            <a:off x="8393552" y="5948424"/>
-            <a:ext cx="1434576" cy="369332"/>
-          </a:xfrm>
-          <a:prstGeom prst="rect">
-            <a:avLst/>
-          </a:prstGeom>
-          <a:noFill/>
-        </p:spPr>
-        <p:txBody>
-          <a:bodyPr wrap="square">
-            <a:spAutoFit/>
-          </a:bodyPr>
-          <a:lstStyle/>
-          <a:p>
-            <a:r>
-              <a:rPr lang="en-VN">
-                <a:latin typeface="Times New Roman" panose="02020603050405020304" pitchFamily="18" charset="0"/>
-                <a:cs typeface="Times New Roman" panose="02020603050405020304" pitchFamily="18" charset="0"/>
-              </a:rPr>
-              <a:t>GD+Adam</a:t>
-            </a:r>
-            <a:endParaRPr lang="en-VN"/>
-          </a:p>
-        </p:txBody>
-      </p:sp>
     </p:spTree>
     <p:extLst>
       <p:ext uri="{BB962C8B-B14F-4D97-AF65-F5344CB8AC3E}">

</xml_diff>